<commit_message>
svm and neural net update accuracy
</commit_message>
<xml_diff>
--- a/DeepSeaCoral.pptx
+++ b/DeepSeaCoral.pptx
@@ -490,7 +490,7 @@
           <a:p>
             <a:fld id="{B1115196-1C6F-4784-83AC-30756D8F10B3}" type="datetimeFigureOut">
               <a:rPr lang="en-US" smtClean="0"/>
-              <a:t>18/3/22</a:t>
+              <a:t>18/3/26</a:t>
             </a:fld>
             <a:endParaRPr lang="en-US"/>
           </a:p>
@@ -919,7 +919,7 @@
           <a:p>
             <a:fld id="{B1115196-1C6F-4784-83AC-30756D8F10B3}" type="datetimeFigureOut">
               <a:rPr lang="en-US" smtClean="0"/>
-              <a:t>18/3/22</a:t>
+              <a:t>18/3/26</a:t>
             </a:fld>
             <a:endParaRPr lang="en-US"/>
           </a:p>
@@ -1124,7 +1124,7 @@
           <a:p>
             <a:fld id="{B1115196-1C6F-4784-83AC-30756D8F10B3}" type="datetimeFigureOut">
               <a:rPr lang="en-US" smtClean="0"/>
-              <a:t>18/3/22</a:t>
+              <a:t>18/3/26</a:t>
             </a:fld>
             <a:endParaRPr lang="en-US"/>
           </a:p>
@@ -1395,7 +1395,7 @@
           <a:p>
             <a:fld id="{B1115196-1C6F-4784-83AC-30756D8F10B3}" type="datetimeFigureOut">
               <a:rPr lang="en-US" smtClean="0"/>
-              <a:t>18/3/22</a:t>
+              <a:t>18/3/26</a:t>
             </a:fld>
             <a:endParaRPr lang="en-US"/>
           </a:p>
@@ -1676,7 +1676,7 @@
           <a:p>
             <a:fld id="{B1115196-1C6F-4784-83AC-30756D8F10B3}" type="datetimeFigureOut">
               <a:rPr lang="en-US" smtClean="0"/>
-              <a:t>18/3/22</a:t>
+              <a:t>18/3/26</a:t>
             </a:fld>
             <a:endParaRPr lang="en-US"/>
           </a:p>
@@ -1911,7 +1911,7 @@
           <a:p>
             <a:fld id="{B1115196-1C6F-4784-83AC-30756D8F10B3}" type="datetimeFigureOut">
               <a:rPr lang="en-US" smtClean="0"/>
-              <a:t>18/3/22</a:t>
+              <a:t>18/3/26</a:t>
             </a:fld>
             <a:endParaRPr lang="en-US"/>
           </a:p>
@@ -2192,7 +2192,7 @@
           <a:p>
             <a:fld id="{B1115196-1C6F-4784-83AC-30756D8F10B3}" type="datetimeFigureOut">
               <a:rPr lang="en-US" smtClean="0"/>
-              <a:t>18/3/22</a:t>
+              <a:t>18/3/26</a:t>
             </a:fld>
             <a:endParaRPr lang="en-US"/>
           </a:p>
@@ -2619,7 +2619,7 @@
           <a:p>
             <a:fld id="{B1115196-1C6F-4784-83AC-30756D8F10B3}" type="datetimeFigureOut">
               <a:rPr lang="en-US" smtClean="0"/>
-              <a:t>18/3/22</a:t>
+              <a:t>18/3/26</a:t>
             </a:fld>
             <a:endParaRPr lang="en-US"/>
           </a:p>
@@ -3142,7 +3142,7 @@
           <a:p>
             <a:fld id="{B1115196-1C6F-4784-83AC-30756D8F10B3}" type="datetimeFigureOut">
               <a:rPr lang="en-US" smtClean="0"/>
-              <a:t>18/3/22</a:t>
+              <a:t>18/3/26</a:t>
             </a:fld>
             <a:endParaRPr lang="en-US"/>
           </a:p>
@@ -3504,7 +3504,7 @@
           <a:p>
             <a:fld id="{B1115196-1C6F-4784-83AC-30756D8F10B3}" type="datetimeFigureOut">
               <a:rPr lang="en-US" smtClean="0"/>
-              <a:t>18/3/22</a:t>
+              <a:t>18/3/26</a:t>
             </a:fld>
             <a:endParaRPr lang="en-US"/>
           </a:p>
@@ -4060,7 +4060,7 @@
           <a:p>
             <a:fld id="{B1115196-1C6F-4784-83AC-30756D8F10B3}" type="datetimeFigureOut">
               <a:rPr lang="en-US" smtClean="0"/>
-              <a:t>18/3/22</a:t>
+              <a:t>18/3/26</a:t>
             </a:fld>
             <a:endParaRPr lang="en-US"/>
           </a:p>
@@ -4285,7 +4285,7 @@
           <a:p>
             <a:fld id="{B1115196-1C6F-4784-83AC-30756D8F10B3}" type="datetimeFigureOut">
               <a:rPr lang="en-US" smtClean="0"/>
-              <a:t>18/3/22</a:t>
+              <a:t>18/3/26</a:t>
             </a:fld>
             <a:endParaRPr lang="en-US"/>
           </a:p>
@@ -4431,7 +4431,7 @@
           <a:p>
             <a:fld id="{B1115196-1C6F-4784-83AC-30756D8F10B3}" type="datetimeFigureOut">
               <a:rPr lang="en-US" smtClean="0"/>
-              <a:t>18/3/22</a:t>
+              <a:t>18/3/26</a:t>
             </a:fld>
             <a:endParaRPr lang="en-US"/>
           </a:p>
@@ -4896,7 +4896,7 @@
           <a:p>
             <a:fld id="{B1115196-1C6F-4784-83AC-30756D8F10B3}" type="datetimeFigureOut">
               <a:rPr lang="en-US" smtClean="0"/>
-              <a:t>18/3/22</a:t>
+              <a:t>18/3/26</a:t>
             </a:fld>
             <a:endParaRPr lang="en-US"/>
           </a:p>
@@ -5118,7 +5118,7 @@
           <a:p>
             <a:fld id="{B1115196-1C6F-4784-83AC-30756D8F10B3}" type="datetimeFigureOut">
               <a:rPr lang="en-US" smtClean="0"/>
-              <a:t>18/3/22</a:t>
+              <a:t>18/3/26</a:t>
             </a:fld>
             <a:endParaRPr lang="en-US"/>
           </a:p>
@@ -6071,12 +6071,18 @@
           <a:p>
             <a:r>
               <a:rPr kumimoji="1" lang="en-US" altLang="zh-CN" dirty="0" smtClean="0"/>
-              <a:t>Accuracy reaches 80</a:t>
+              <a:t>Accuracy reaches </a:t>
+            </a:r>
+            <a:r>
+              <a:rPr kumimoji="1" lang="en-US" altLang="zh-CN" dirty="0" smtClean="0"/>
+              <a:t>50</a:t>
             </a:r>
             <a:r>
               <a:rPr kumimoji="1" lang="en-US" altLang="zh-CN" dirty="0" smtClean="0"/>
               <a:t>%</a:t>
             </a:r>
+          </a:p>
+          <a:p>
             <a:endParaRPr kumimoji="1" lang="en-US" altLang="zh-CN" dirty="0" smtClean="0"/>
           </a:p>
           <a:p>
@@ -6088,7 +6094,21 @@
           <a:p>
             <a:r>
               <a:rPr kumimoji="1" lang="en-US" altLang="zh-CN" dirty="0" smtClean="0"/>
-              <a:t>F1 score reaches 0.7</a:t>
+              <a:t>F1 score reaches </a:t>
+            </a:r>
+            <a:r>
+              <a:rPr kumimoji="1" lang="en-US" altLang="zh-CN" dirty="0" smtClean="0"/>
+              <a:t>0.7</a:t>
+            </a:r>
+          </a:p>
+          <a:p>
+            <a:r>
+              <a:rPr kumimoji="1" lang="en-US" altLang="zh-CN" dirty="0" smtClean="0"/>
+              <a:t>Draw a suitability </a:t>
+            </a:r>
+            <a:r>
+              <a:rPr kumimoji="1" lang="en-US" altLang="zh-CN" dirty="0" smtClean="0"/>
+              <a:t>map</a:t>
             </a:r>
             <a:endParaRPr kumimoji="1" lang="zh-CN" altLang="en-US" dirty="0"/>
           </a:p>
@@ -6116,8 +6136,8 @@
         </p:blipFill>
         <p:spPr>
           <a:xfrm>
-            <a:off x="3710226" y="3885665"/>
-            <a:ext cx="3750822" cy="2487145"/>
+            <a:off x="3839661" y="4444678"/>
+            <a:ext cx="3621387" cy="1763827"/>
           </a:xfrm>
           <a:prstGeom prst="rect">
             <a:avLst/>
@@ -6126,7 +6146,7 @@
       </p:pic>
       <p:pic>
         <p:nvPicPr>
-          <p:cNvPr id="5" name="图片 4" descr="Untitled.jpeg"/>
+          <p:cNvPr id="6" name="图片 5" descr="Untitled.jpeg"/>
           <p:cNvPicPr>
             <a:picLocks noChangeAspect="1"/>
           </p:cNvPicPr>
@@ -6146,8 +6166,38 @@
         </p:blipFill>
         <p:spPr>
           <a:xfrm>
-            <a:off x="1359261" y="2599978"/>
-            <a:ext cx="6101788" cy="1041087"/>
+            <a:off x="779463" y="3492246"/>
+            <a:ext cx="6681586" cy="952431"/>
+          </a:xfrm>
+          <a:prstGeom prst="rect">
+            <a:avLst/>
+          </a:prstGeom>
+        </p:spPr>
+      </p:pic>
+      <p:pic>
+        <p:nvPicPr>
+          <p:cNvPr id="8" name="图片 7" descr="1231231241.jpeg"/>
+          <p:cNvPicPr>
+            <a:picLocks noChangeAspect="1"/>
+          </p:cNvPicPr>
+          <p:nvPr/>
+        </p:nvPicPr>
+        <p:blipFill>
+          <a:blip r:embed="rId4">
+            <a:extLst>
+              <a:ext uri="{28A0092B-C50C-407E-A947-70E740481C1C}">
+                <a14:useLocalDpi xmlns:a14="http://schemas.microsoft.com/office/drawing/2010/main" val="0"/>
+              </a:ext>
+            </a:extLst>
+          </a:blip>
+          <a:stretch>
+            <a:fillRect/>
+          </a:stretch>
+        </p:blipFill>
+        <p:spPr>
+          <a:xfrm>
+            <a:off x="779463" y="2351314"/>
+            <a:ext cx="6681586" cy="1140932"/>
           </a:xfrm>
           <a:prstGeom prst="rect">
             <a:avLst/>
@@ -7282,11 +7332,7 @@
           <a:p>
             <a:r>
               <a:rPr kumimoji="1" lang="en-US" altLang="zh-CN" dirty="0" smtClean="0"/>
-              <a:t>Database </a:t>
-            </a:r>
-            <a:r>
-              <a:rPr kumimoji="1" lang="en-US" altLang="zh-CN" dirty="0" smtClean="0"/>
-              <a:t>Description</a:t>
+              <a:t>Database Description</a:t>
             </a:r>
             <a:endParaRPr kumimoji="1" lang="zh-CN" altLang="en-US" dirty="0"/>
           </a:p>

</xml_diff>